<commit_message>
major changes and clean to the documentation
</commit_message>
<xml_diff>
--- a/additional-documentation/meeting-12092025/psi-12092025.pptx
+++ b/additional-documentation/meeting-12092025/psi-12092025.pptx
@@ -112,6 +112,11 @@
       </a:defRPr>
     </a:lvl9pPr>
   </p:defaultTextStyle>
+  <p:extLst>
+    <p:ext uri="{EFAFB233-063F-42B5-8137-9DF3F51BA10A}">
+      <p15:sldGuideLst xmlns:p15="http://schemas.microsoft.com/office/powerpoint/2012/main"/>
+    </p:ext>
+  </p:extLst>
 </p:presentation>
 </file>
 
@@ -264,7 +269,7 @@
           <a:p>
             <a:fld id="{21F43A19-3F72-BA4F-BF73-9531819B8E87}" type="datetimeFigureOut">
               <a:rPr lang="en-US" smtClean="0"/>
-              <a:t>9/12/25</a:t>
+              <a:t>10/24/25</a:t>
             </a:fld>
             <a:endParaRPr lang="en-US"/>
           </a:p>
@@ -464,7 +469,7 @@
           <a:p>
             <a:fld id="{21F43A19-3F72-BA4F-BF73-9531819B8E87}" type="datetimeFigureOut">
               <a:rPr lang="en-US" smtClean="0"/>
-              <a:t>9/12/25</a:t>
+              <a:t>10/24/25</a:t>
             </a:fld>
             <a:endParaRPr lang="en-US"/>
           </a:p>
@@ -674,7 +679,7 @@
           <a:p>
             <a:fld id="{21F43A19-3F72-BA4F-BF73-9531819B8E87}" type="datetimeFigureOut">
               <a:rPr lang="en-US" smtClean="0"/>
-              <a:t>9/12/25</a:t>
+              <a:t>10/24/25</a:t>
             </a:fld>
             <a:endParaRPr lang="en-US"/>
           </a:p>
@@ -874,7 +879,7 @@
           <a:p>
             <a:fld id="{21F43A19-3F72-BA4F-BF73-9531819B8E87}" type="datetimeFigureOut">
               <a:rPr lang="en-US" smtClean="0"/>
-              <a:t>9/12/25</a:t>
+              <a:t>10/24/25</a:t>
             </a:fld>
             <a:endParaRPr lang="en-US"/>
           </a:p>
@@ -1150,7 +1155,7 @@
           <a:p>
             <a:fld id="{21F43A19-3F72-BA4F-BF73-9531819B8E87}" type="datetimeFigureOut">
               <a:rPr lang="en-US" smtClean="0"/>
-              <a:t>9/12/25</a:t>
+              <a:t>10/24/25</a:t>
             </a:fld>
             <a:endParaRPr lang="en-US"/>
           </a:p>
@@ -1418,7 +1423,7 @@
           <a:p>
             <a:fld id="{21F43A19-3F72-BA4F-BF73-9531819B8E87}" type="datetimeFigureOut">
               <a:rPr lang="en-US" smtClean="0"/>
-              <a:t>9/12/25</a:t>
+              <a:t>10/24/25</a:t>
             </a:fld>
             <a:endParaRPr lang="en-US"/>
           </a:p>
@@ -1833,7 +1838,7 @@
           <a:p>
             <a:fld id="{21F43A19-3F72-BA4F-BF73-9531819B8E87}" type="datetimeFigureOut">
               <a:rPr lang="en-US" smtClean="0"/>
-              <a:t>9/12/25</a:t>
+              <a:t>10/24/25</a:t>
             </a:fld>
             <a:endParaRPr lang="en-US"/>
           </a:p>
@@ -1975,7 +1980,7 @@
           <a:p>
             <a:fld id="{21F43A19-3F72-BA4F-BF73-9531819B8E87}" type="datetimeFigureOut">
               <a:rPr lang="en-US" smtClean="0"/>
-              <a:t>9/12/25</a:t>
+              <a:t>10/24/25</a:t>
             </a:fld>
             <a:endParaRPr lang="en-US"/>
           </a:p>
@@ -2088,7 +2093,7 @@
           <a:p>
             <a:fld id="{21F43A19-3F72-BA4F-BF73-9531819B8E87}" type="datetimeFigureOut">
               <a:rPr lang="en-US" smtClean="0"/>
-              <a:t>9/12/25</a:t>
+              <a:t>10/24/25</a:t>
             </a:fld>
             <a:endParaRPr lang="en-US"/>
           </a:p>
@@ -2401,7 +2406,7 @@
           <a:p>
             <a:fld id="{21F43A19-3F72-BA4F-BF73-9531819B8E87}" type="datetimeFigureOut">
               <a:rPr lang="en-US" smtClean="0"/>
-              <a:t>9/12/25</a:t>
+              <a:t>10/24/25</a:t>
             </a:fld>
             <a:endParaRPr lang="en-US"/>
           </a:p>
@@ -2690,7 +2695,7 @@
           <a:p>
             <a:fld id="{21F43A19-3F72-BA4F-BF73-9531819B8E87}" type="datetimeFigureOut">
               <a:rPr lang="en-US" smtClean="0"/>
-              <a:t>9/12/25</a:t>
+              <a:t>10/24/25</a:t>
             </a:fld>
             <a:endParaRPr lang="en-US"/>
           </a:p>
@@ -2933,7 +2938,7 @@
           <a:p>
             <a:fld id="{21F43A19-3F72-BA4F-BF73-9531819B8E87}" type="datetimeFigureOut">
               <a:rPr lang="en-US" smtClean="0"/>
-              <a:t>9/12/25</a:t>
+              <a:t>10/24/25</a:t>
             </a:fld>
             <a:endParaRPr lang="en-US"/>
           </a:p>
@@ -4139,7 +4144,7 @@
             </a:r>
             <a:r>
               <a:rPr lang="en-US" i="1" dirty="0"/>
-              <a:t>assay name</a:t>
+              <a:t>assay name + label</a:t>
             </a:r>
             <a:r>
               <a:rPr lang="en-US" dirty="0"/>

</xml_diff>